<commit_message>
corrected heatmaps w/ alphabetical order
</commit_message>
<xml_diff>
--- a/Figures/By section - Figures - 20191218.pptx
+++ b/Figures/By section - Figures - 20191218.pptx
@@ -416,7 +416,7 @@
           <a:p>
             <a:fld id="{FF60F64E-9E1D-4BCC-9A78-20808DC0C6B0}" type="datetimeFigureOut">
               <a:rPr lang="en-US" smtClean="0"/>
-              <a:t>18-Dec-19</a:t>
+              <a:t>12/29/2019</a:t>
             </a:fld>
             <a:endParaRPr lang="en-US"/>
           </a:p>
@@ -586,7 +586,7 @@
           <a:p>
             <a:fld id="{FF60F64E-9E1D-4BCC-9A78-20808DC0C6B0}" type="datetimeFigureOut">
               <a:rPr lang="en-US" smtClean="0"/>
-              <a:t>18-Dec-19</a:t>
+              <a:t>12/29/2019</a:t>
             </a:fld>
             <a:endParaRPr lang="en-US"/>
           </a:p>
@@ -766,7 +766,7 @@
           <a:p>
             <a:fld id="{FF60F64E-9E1D-4BCC-9A78-20808DC0C6B0}" type="datetimeFigureOut">
               <a:rPr lang="en-US" smtClean="0"/>
-              <a:t>18-Dec-19</a:t>
+              <a:t>12/29/2019</a:t>
             </a:fld>
             <a:endParaRPr lang="en-US"/>
           </a:p>
@@ -936,7 +936,7 @@
           <a:p>
             <a:fld id="{FF60F64E-9E1D-4BCC-9A78-20808DC0C6B0}" type="datetimeFigureOut">
               <a:rPr lang="en-US" smtClean="0"/>
-              <a:t>18-Dec-19</a:t>
+              <a:t>12/29/2019</a:t>
             </a:fld>
             <a:endParaRPr lang="en-US"/>
           </a:p>
@@ -1180,7 +1180,7 @@
           <a:p>
             <a:fld id="{FF60F64E-9E1D-4BCC-9A78-20808DC0C6B0}" type="datetimeFigureOut">
               <a:rPr lang="en-US" smtClean="0"/>
-              <a:t>18-Dec-19</a:t>
+              <a:t>12/29/2019</a:t>
             </a:fld>
             <a:endParaRPr lang="en-US"/>
           </a:p>
@@ -1412,7 +1412,7 @@
           <a:p>
             <a:fld id="{FF60F64E-9E1D-4BCC-9A78-20808DC0C6B0}" type="datetimeFigureOut">
               <a:rPr lang="en-US" smtClean="0"/>
-              <a:t>18-Dec-19</a:t>
+              <a:t>12/29/2019</a:t>
             </a:fld>
             <a:endParaRPr lang="en-US"/>
           </a:p>
@@ -1779,7 +1779,7 @@
           <a:p>
             <a:fld id="{FF60F64E-9E1D-4BCC-9A78-20808DC0C6B0}" type="datetimeFigureOut">
               <a:rPr lang="en-US" smtClean="0"/>
-              <a:t>18-Dec-19</a:t>
+              <a:t>12/29/2019</a:t>
             </a:fld>
             <a:endParaRPr lang="en-US"/>
           </a:p>
@@ -1897,7 +1897,7 @@
           <a:p>
             <a:fld id="{FF60F64E-9E1D-4BCC-9A78-20808DC0C6B0}" type="datetimeFigureOut">
               <a:rPr lang="en-US" smtClean="0"/>
-              <a:t>18-Dec-19</a:t>
+              <a:t>12/29/2019</a:t>
             </a:fld>
             <a:endParaRPr lang="en-US"/>
           </a:p>
@@ -1992,7 +1992,7 @@
           <a:p>
             <a:fld id="{FF60F64E-9E1D-4BCC-9A78-20808DC0C6B0}" type="datetimeFigureOut">
               <a:rPr lang="en-US" smtClean="0"/>
-              <a:t>18-Dec-19</a:t>
+              <a:t>12/29/2019</a:t>
             </a:fld>
             <a:endParaRPr lang="en-US"/>
           </a:p>
@@ -2269,7 +2269,7 @@
           <a:p>
             <a:fld id="{FF60F64E-9E1D-4BCC-9A78-20808DC0C6B0}" type="datetimeFigureOut">
               <a:rPr lang="en-US" smtClean="0"/>
-              <a:t>18-Dec-19</a:t>
+              <a:t>12/29/2019</a:t>
             </a:fld>
             <a:endParaRPr lang="en-US"/>
           </a:p>
@@ -2526,7 +2526,7 @@
           <a:p>
             <a:fld id="{FF60F64E-9E1D-4BCC-9A78-20808DC0C6B0}" type="datetimeFigureOut">
               <a:rPr lang="en-US" smtClean="0"/>
-              <a:t>18-Dec-19</a:t>
+              <a:t>12/29/2019</a:t>
             </a:fld>
             <a:endParaRPr lang="en-US"/>
           </a:p>
@@ -2739,7 +2739,7 @@
           <a:p>
             <a:fld id="{FF60F64E-9E1D-4BCC-9A78-20808DC0C6B0}" type="datetimeFigureOut">
               <a:rPr lang="en-US" smtClean="0"/>
-              <a:t>18-Dec-19</a:t>
+              <a:t>12/29/2019</a:t>
             </a:fld>
             <a:endParaRPr lang="en-US"/>
           </a:p>
@@ -3341,7 +3341,7 @@
           <p:nvPr/>
         </p:nvPicPr>
         <p:blipFill>
-          <a:blip r:embed="rId2">
+          <a:blip r:embed="rId2" cstate="hqprint">
             <a:extLst>
               <a:ext uri="{28A0092B-C50C-407E-A947-70E740481C1C}">
                 <a14:useLocalDpi xmlns:a14="http://schemas.microsoft.com/office/drawing/2010/main" val="0"/>
@@ -3377,7 +3377,7 @@
           <p:nvPr/>
         </p:nvPicPr>
         <p:blipFill>
-          <a:blip r:embed="rId3">
+          <a:blip r:embed="rId3" cstate="hqprint">
             <a:extLst>
               <a:ext uri="{28A0092B-C50C-407E-A947-70E740481C1C}">
                 <a14:useLocalDpi xmlns:a14="http://schemas.microsoft.com/office/drawing/2010/main" val="0"/>
@@ -3442,10 +3442,10 @@
         </p:nvGrpSpPr>
         <p:grpSpPr>
           <a:xfrm>
-            <a:off x="3586567" y="1703896"/>
-            <a:ext cx="12872633" cy="18705825"/>
-            <a:chOff x="477079" y="688738"/>
-            <a:chExt cx="15416764" cy="22402820"/>
+            <a:off x="3114618" y="1424939"/>
+            <a:ext cx="12964835" cy="18984782"/>
+            <a:chOff x="477079" y="354648"/>
+            <a:chExt cx="15527188" cy="22736910"/>
           </a:xfrm>
         </p:grpSpPr>
         <p:pic>
@@ -3476,8 +3476,8 @@
           </p:blipFill>
           <p:spPr>
             <a:xfrm>
-              <a:off x="684132" y="688738"/>
-              <a:ext cx="7457189" cy="6711469"/>
+              <a:off x="783606" y="354649"/>
+              <a:ext cx="7600385" cy="7045558"/>
             </a:xfrm>
             <a:prstGeom prst="rect">
               <a:avLst/>
@@ -3486,7 +3486,7 @@
         </p:pic>
         <p:pic>
           <p:nvPicPr>
-            <p:cNvPr id="6" name="Picture 5" descr="A picture containing book, sitting, room&#10;&#10;Description automatically generated">
+            <p:cNvPr id="6" name="Picture 5">
               <a:extLst>
                 <a:ext uri="{FF2B5EF4-FFF2-40B4-BE49-F238E27FC236}">
                   <a16:creationId xmlns:a16="http://schemas.microsoft.com/office/drawing/2014/main" id="{19302B0A-A5B0-466D-8036-845FDB5EBBFF}"/>
@@ -3512,8 +3512,8 @@
           </p:blipFill>
           <p:spPr>
             <a:xfrm>
-              <a:off x="8436654" y="688738"/>
-              <a:ext cx="7457189" cy="6711469"/>
+              <a:off x="8403881" y="354648"/>
+              <a:ext cx="7600386" cy="7045559"/>
             </a:xfrm>
             <a:prstGeom prst="rect">
               <a:avLst/>
@@ -3679,7 +3679,7 @@
         </p:nvSpPr>
         <p:spPr>
           <a:xfrm flipH="1">
-            <a:off x="5049280" y="809225"/>
+            <a:off x="4577331" y="809225"/>
             <a:ext cx="3646918" cy="875176"/>
           </a:xfrm>
           <a:prstGeom prst="rect">
@@ -3715,7 +3715,7 @@
         </p:nvSpPr>
         <p:spPr>
           <a:xfrm flipH="1">
-            <a:off x="11522453" y="828720"/>
+            <a:off x="11050504" y="828720"/>
             <a:ext cx="3646918" cy="875176"/>
           </a:xfrm>
           <a:prstGeom prst="rect">
@@ -3751,8 +3751,8 @@
         </p:nvSpPr>
         <p:spPr>
           <a:xfrm flipH="1">
-            <a:off x="-225358" y="11305551"/>
-            <a:ext cx="3646918" cy="875176"/>
+            <a:off x="29495" y="11305551"/>
+            <a:ext cx="2920115" cy="875176"/>
           </a:xfrm>
           <a:prstGeom prst="rect">
             <a:avLst/>
@@ -3787,8 +3787,8 @@
         </p:nvSpPr>
         <p:spPr>
           <a:xfrm flipH="1">
-            <a:off x="-942403" y="16499822"/>
-            <a:ext cx="3646918" cy="875176"/>
+            <a:off x="678424" y="16499822"/>
+            <a:ext cx="1554141" cy="875176"/>
           </a:xfrm>
           <a:prstGeom prst="rect">
             <a:avLst/>
@@ -3823,7 +3823,7 @@
         </p:nvSpPr>
         <p:spPr>
           <a:xfrm>
-            <a:off x="5501617" y="21143327"/>
+            <a:off x="5029668" y="21143327"/>
             <a:ext cx="9462014" cy="927177"/>
           </a:xfrm>
           <a:prstGeom prst="rect">
@@ -4521,21 +4521,6 @@
 </file>
 
 <file path=customXml/item1.xml><?xml version="1.0" encoding="utf-8"?>
-<p:properties xmlns:p="http://schemas.microsoft.com/office/2006/metadata/properties" xmlns:xsi="http://www.w3.org/2001/XMLSchema-instance" xmlns:pc="http://schemas.microsoft.com/office/infopath/2007/PartnerControls">
-  <documentManagement/>
-</p:properties>
-</file>
-
-<file path=customXml/item2.xml><?xml version="1.0" encoding="utf-8"?>
-<?mso-contentType ?>
-<FormTemplates xmlns="http://schemas.microsoft.com/sharepoint/v3/contenttype/forms">
-  <Display>DocumentLibraryForm</Display>
-  <Edit>DocumentLibraryForm</Edit>
-  <New>DocumentLibraryForm</New>
-</FormTemplates>
-</file>
-
-<file path=customXml/item3.xml><?xml version="1.0" encoding="utf-8"?>
 <ct:contentTypeSchema xmlns:ct="http://schemas.microsoft.com/office/2006/metadata/contentType" xmlns:ma="http://schemas.microsoft.com/office/2006/metadata/properties/metaAttributes" ct:_="" ma:_="" ma:contentTypeName="Document" ma:contentTypeID="0x010100B0FE3DB7F9582E4589EB6EE11F53D497" ma:contentTypeVersion="11" ma:contentTypeDescription="Create a new document." ma:contentTypeScope="" ma:versionID="a8eee71a03a661226bb1b69150cc7522">
   <xsd:schema xmlns:xsd="http://www.w3.org/2001/XMLSchema" xmlns:xs="http://www.w3.org/2001/XMLSchema" xmlns:p="http://schemas.microsoft.com/office/2006/metadata/properties" xmlns:ns3="fb9a896c-a559-47ed-92af-7eebfb3245c5" xmlns:ns4="7616764c-e4ab-459e-9ec1-3eeda0498521" targetNamespace="http://schemas.microsoft.com/office/2006/metadata/properties" ma:root="true" ma:fieldsID="31a1136f847ce586cbfdf557c16e8832" ns3:_="" ns4:_="">
     <xsd:import namespace="fb9a896c-a559-47ed-92af-7eebfb3245c5"/>
@@ -4744,32 +4729,22 @@
 </ct:contentTypeSchema>
 </file>
 
-<file path=customXml/itemProps1.xml><?xml version="1.0" encoding="utf-8"?>
-<ds:datastoreItem xmlns:ds="http://schemas.openxmlformats.org/officeDocument/2006/customXml" ds:itemID="{892E793A-BEA8-4A98-BCD5-3B70DA9B95FF}">
-  <ds:schemaRefs>
-    <ds:schemaRef ds:uri="http://purl.org/dc/dcmitype/"/>
-    <ds:schemaRef ds:uri="http://purl.org/dc/elements/1.1/"/>
-    <ds:schemaRef ds:uri="http://schemas.microsoft.com/office/2006/metadata/properties"/>
-    <ds:schemaRef ds:uri="7616764c-e4ab-459e-9ec1-3eeda0498521"/>
-    <ds:schemaRef ds:uri="http://schemas.microsoft.com/office/2006/documentManagement/types"/>
-    <ds:schemaRef ds:uri="http://schemas.openxmlformats.org/package/2006/metadata/core-properties"/>
-    <ds:schemaRef ds:uri="fb9a896c-a559-47ed-92af-7eebfb3245c5"/>
-    <ds:schemaRef ds:uri="http://www.w3.org/XML/1998/namespace"/>
-    <ds:schemaRef ds:uri="http://schemas.microsoft.com/office/infopath/2007/PartnerControls"/>
-    <ds:schemaRef ds:uri="http://purl.org/dc/terms/"/>
-  </ds:schemaRefs>
-</ds:datastoreItem>
+<file path=customXml/item2.xml><?xml version="1.0" encoding="utf-8"?>
+<?mso-contentType ?>
+<FormTemplates xmlns="http://schemas.microsoft.com/sharepoint/v3/contenttype/forms">
+  <Display>DocumentLibraryForm</Display>
+  <Edit>DocumentLibraryForm</Edit>
+  <New>DocumentLibraryForm</New>
+</FormTemplates>
 </file>
 
-<file path=customXml/itemProps2.xml><?xml version="1.0" encoding="utf-8"?>
-<ds:datastoreItem xmlns:ds="http://schemas.openxmlformats.org/officeDocument/2006/customXml" ds:itemID="{90ADFCBF-10B1-4C66-B423-72755B56D958}">
-  <ds:schemaRefs>
-    <ds:schemaRef ds:uri="http://schemas.microsoft.com/sharepoint/v3/contenttype/forms"/>
-  </ds:schemaRefs>
-</ds:datastoreItem>
+<file path=customXml/item3.xml><?xml version="1.0" encoding="utf-8"?>
+<p:properties xmlns:p="http://schemas.microsoft.com/office/2006/metadata/properties" xmlns:xsi="http://www.w3.org/2001/XMLSchema-instance" xmlns:pc="http://schemas.microsoft.com/office/infopath/2007/PartnerControls">
+  <documentManagement/>
+</p:properties>
 </file>
 
-<file path=customXml/itemProps3.xml><?xml version="1.0" encoding="utf-8"?>
+<file path=customXml/itemProps1.xml><?xml version="1.0" encoding="utf-8"?>
 <ds:datastoreItem xmlns:ds="http://schemas.openxmlformats.org/officeDocument/2006/customXml" ds:itemID="{3DE5C136-50D6-4E93-875F-D755A82A3546}">
   <ds:schemaRefs>
     <ds:schemaRef ds:uri="http://schemas.microsoft.com/office/2006/metadata/contentType"/>
@@ -4786,4 +4761,29 @@
     <ds:schemaRef ds:uri="http://schemas.microsoft.com/internal/obd"/>
   </ds:schemaRefs>
 </ds:datastoreItem>
+</file>
+
+<file path=customXml/itemProps2.xml><?xml version="1.0" encoding="utf-8"?>
+<ds:datastoreItem xmlns:ds="http://schemas.openxmlformats.org/officeDocument/2006/customXml" ds:itemID="{90ADFCBF-10B1-4C66-B423-72755B56D958}">
+  <ds:schemaRefs>
+    <ds:schemaRef ds:uri="http://schemas.microsoft.com/sharepoint/v3/contenttype/forms"/>
+  </ds:schemaRefs>
+</ds:datastoreItem>
+</file>
+
+<file path=customXml/itemProps3.xml><?xml version="1.0" encoding="utf-8"?>
+<ds:datastoreItem xmlns:ds="http://schemas.openxmlformats.org/officeDocument/2006/customXml" ds:itemID="{892E793A-BEA8-4A98-BCD5-3B70DA9B95FF}">
+  <ds:schemaRefs>
+    <ds:schemaRef ds:uri="http://purl.org/dc/dcmitype/"/>
+    <ds:schemaRef ds:uri="http://purl.org/dc/elements/1.1/"/>
+    <ds:schemaRef ds:uri="http://schemas.microsoft.com/office/2006/metadata/properties"/>
+    <ds:schemaRef ds:uri="7616764c-e4ab-459e-9ec1-3eeda0498521"/>
+    <ds:schemaRef ds:uri="http://schemas.microsoft.com/office/2006/documentManagement/types"/>
+    <ds:schemaRef ds:uri="http://schemas.openxmlformats.org/package/2006/metadata/core-properties"/>
+    <ds:schemaRef ds:uri="fb9a896c-a559-47ed-92af-7eebfb3245c5"/>
+    <ds:schemaRef ds:uri="http://www.w3.org/XML/1998/namespace"/>
+    <ds:schemaRef ds:uri="http://schemas.microsoft.com/office/infopath/2007/PartnerControls"/>
+    <ds:schemaRef ds:uri="http://purl.org/dc/terms/"/>
+  </ds:schemaRefs>
+</ds:datastoreItem>
 </file>
</xml_diff>